<commit_message>
I will work on nCRP sampler
</commit_message>
<xml_diff>
--- a/I2Slice/doc/SamplerCycle.pptx
+++ b/I2Slice/doc/SamplerCycle.pptx
@@ -7,6 +7,7 @@
   <p:sldIdLst>
     <p:sldId id="256" r:id="rId2"/>
     <p:sldId id="257" r:id="rId3"/>
+    <p:sldId id="258" r:id="rId4"/>
   </p:sldIdLst>
   <p:sldSz cx="9144000" cy="6858000" type="screen4x3"/>
   <p:notesSz cx="6858000" cy="9144000"/>
@@ -105,6 +106,22 @@
       </a:defRPr>
     </a:lvl9pPr>
   </p:defaultTextStyle>
+  <p:extLst>
+    <p:ext uri="{EFAFB233-063F-42B5-8137-9DF3F51BA10A}">
+      <p15:sldGuideLst xmlns:p15="http://schemas.microsoft.com/office/powerpoint/2012/main">
+        <p15:guide id="1" orient="horz" pos="2160">
+          <p15:clr>
+            <a:srgbClr val="A4A3A4"/>
+          </p15:clr>
+        </p15:guide>
+        <p15:guide id="2" pos="2880">
+          <p15:clr>
+            <a:srgbClr val="A4A3A4"/>
+          </p15:clr>
+        </p15:guide>
+      </p15:sldGuideLst>
+    </p:ext>
+  </p:extLst>
 </p:presentation>
 </file>
 
@@ -289,7 +306,7 @@
           <a:p>
             <a:fld id="{4F5F247D-E2A3-4D03-B070-1F21F6BD23F7}" type="datetimeFigureOut">
               <a:rPr lang="en-US" smtClean="0"/>
-              <a:t>9/20/2016</a:t>
+              <a:t>10/12/2016</a:t>
             </a:fld>
             <a:endParaRPr lang="en-US"/>
           </a:p>
@@ -459,7 +476,7 @@
           <a:p>
             <a:fld id="{4F5F247D-E2A3-4D03-B070-1F21F6BD23F7}" type="datetimeFigureOut">
               <a:rPr lang="en-US" smtClean="0"/>
-              <a:t>9/20/2016</a:t>
+              <a:t>10/12/2016</a:t>
             </a:fld>
             <a:endParaRPr lang="en-US"/>
           </a:p>
@@ -639,7 +656,7 @@
           <a:p>
             <a:fld id="{4F5F247D-E2A3-4D03-B070-1F21F6BD23F7}" type="datetimeFigureOut">
               <a:rPr lang="en-US" smtClean="0"/>
-              <a:t>9/20/2016</a:t>
+              <a:t>10/12/2016</a:t>
             </a:fld>
             <a:endParaRPr lang="en-US"/>
           </a:p>
@@ -809,7 +826,7 @@
           <a:p>
             <a:fld id="{4F5F247D-E2A3-4D03-B070-1F21F6BD23F7}" type="datetimeFigureOut">
               <a:rPr lang="en-US" smtClean="0"/>
-              <a:t>9/20/2016</a:t>
+              <a:t>10/12/2016</a:t>
             </a:fld>
             <a:endParaRPr lang="en-US"/>
           </a:p>
@@ -1055,7 +1072,7 @@
           <a:p>
             <a:fld id="{4F5F247D-E2A3-4D03-B070-1F21F6BD23F7}" type="datetimeFigureOut">
               <a:rPr lang="en-US" smtClean="0"/>
-              <a:t>9/20/2016</a:t>
+              <a:t>10/12/2016</a:t>
             </a:fld>
             <a:endParaRPr lang="en-US"/>
           </a:p>
@@ -1343,7 +1360,7 @@
           <a:p>
             <a:fld id="{4F5F247D-E2A3-4D03-B070-1F21F6BD23F7}" type="datetimeFigureOut">
               <a:rPr lang="en-US" smtClean="0"/>
-              <a:t>9/20/2016</a:t>
+              <a:t>10/12/2016</a:t>
             </a:fld>
             <a:endParaRPr lang="en-US"/>
           </a:p>
@@ -1765,7 +1782,7 @@
           <a:p>
             <a:fld id="{4F5F247D-E2A3-4D03-B070-1F21F6BD23F7}" type="datetimeFigureOut">
               <a:rPr lang="en-US" smtClean="0"/>
-              <a:t>9/20/2016</a:t>
+              <a:t>10/12/2016</a:t>
             </a:fld>
             <a:endParaRPr lang="en-US"/>
           </a:p>
@@ -1883,7 +1900,7 @@
           <a:p>
             <a:fld id="{4F5F247D-E2A3-4D03-B070-1F21F6BD23F7}" type="datetimeFigureOut">
               <a:rPr lang="en-US" smtClean="0"/>
-              <a:t>9/20/2016</a:t>
+              <a:t>10/12/2016</a:t>
             </a:fld>
             <a:endParaRPr lang="en-US"/>
           </a:p>
@@ -1978,7 +1995,7 @@
           <a:p>
             <a:fld id="{4F5F247D-E2A3-4D03-B070-1F21F6BD23F7}" type="datetimeFigureOut">
               <a:rPr lang="en-US" smtClean="0"/>
-              <a:t>9/20/2016</a:t>
+              <a:t>10/12/2016</a:t>
             </a:fld>
             <a:endParaRPr lang="en-US"/>
           </a:p>
@@ -2255,7 +2272,7 @@
           <a:p>
             <a:fld id="{4F5F247D-E2A3-4D03-B070-1F21F6BD23F7}" type="datetimeFigureOut">
               <a:rPr lang="en-US" smtClean="0"/>
-              <a:t>9/20/2016</a:t>
+              <a:t>10/12/2016</a:t>
             </a:fld>
             <a:endParaRPr lang="en-US"/>
           </a:p>
@@ -2508,7 +2525,7 @@
           <a:p>
             <a:fld id="{4F5F247D-E2A3-4D03-B070-1F21F6BD23F7}" type="datetimeFigureOut">
               <a:rPr lang="en-US" smtClean="0"/>
-              <a:t>9/20/2016</a:t>
+              <a:t>10/12/2016</a:t>
             </a:fld>
             <a:endParaRPr lang="en-US"/>
           </a:p>
@@ -2721,7 +2738,7 @@
           <a:p>
             <a:fld id="{4F5F247D-E2A3-4D03-B070-1F21F6BD23F7}" type="datetimeFigureOut">
               <a:rPr lang="en-US" smtClean="0"/>
-              <a:t>9/20/2016</a:t>
+              <a:t>10/12/2016</a:t>
             </a:fld>
             <a:endParaRPr lang="en-US"/>
           </a:p>
@@ -3096,8 +3113,8 @@
           <a:chExt cx="0" cy="0"/>
         </a:xfrm>
       </p:grpSpPr>
-      <mc:AlternateContent xmlns:mc="http://schemas.openxmlformats.org/markup-compatibility/2006">
-        <mc:Choice xmlns:a14="http://schemas.microsoft.com/office/drawing/2010/main" Requires="a14">
+      <mc:AlternateContent xmlns:mc="http://schemas.openxmlformats.org/markup-compatibility/2006" xmlns:a14="http://schemas.microsoft.com/office/drawing/2010/main">
+        <mc:Choice Requires="a14">
           <p:sp>
             <p:nvSpPr>
               <p:cNvPr id="4" name="TextBox 3"/>
@@ -3137,6 +3154,7 @@
               </a:bodyPr>
               <a:lstStyle/>
               <a:p>
+                <a:pPr/>
                 <a14:m>
                   <m:oMathPara xmlns:m="http://schemas.openxmlformats.org/officeDocument/2006/math">
                     <m:oMathParaPr>
@@ -3147,7 +3165,7 @@
                         <m:sSubPr>
                           <m:ctrlPr>
                             <a:rPr lang="en-US" b="0" i="1" smtClean="0">
-                              <a:latin typeface="Cambria Math"/>
+                              <a:latin typeface="Cambria Math" panose="02040503050406030204" pitchFamily="18" charset="0"/>
                             </a:rPr>
                           </m:ctrlPr>
                         </m:sSubPr>
@@ -3176,7 +3194,7 @@
             </p:txBody>
           </p:sp>
         </mc:Choice>
-        <mc:Fallback>
+        <mc:Fallback xmlns="">
           <p:sp>
             <p:nvSpPr>
               <p:cNvPr id="4" name="TextBox 3"/>
@@ -3219,8 +3237,8 @@
           </p:sp>
         </mc:Fallback>
       </mc:AlternateContent>
-      <mc:AlternateContent xmlns:mc="http://schemas.openxmlformats.org/markup-compatibility/2006">
-        <mc:Choice xmlns:a14="http://schemas.microsoft.com/office/drawing/2010/main" Requires="a14">
+      <mc:AlternateContent xmlns:mc="http://schemas.openxmlformats.org/markup-compatibility/2006" xmlns:a14="http://schemas.microsoft.com/office/drawing/2010/main">
+        <mc:Choice Requires="a14">
           <p:sp>
             <p:nvSpPr>
               <p:cNvPr id="5" name="TextBox 4"/>
@@ -3260,6 +3278,7 @@
               </a:bodyPr>
               <a:lstStyle/>
               <a:p>
+                <a:pPr/>
                 <a14:m>
                   <m:oMathPara xmlns:m="http://schemas.openxmlformats.org/officeDocument/2006/math">
                     <m:oMathParaPr>
@@ -3270,7 +3289,7 @@
                         <m:sSubPr>
                           <m:ctrlPr>
                             <a:rPr lang="en-US" b="0" i="1" smtClean="0">
-                              <a:latin typeface="Cambria Math"/>
+                              <a:latin typeface="Cambria Math" panose="02040503050406030204" pitchFamily="18" charset="0"/>
                             </a:rPr>
                           </m:ctrlPr>
                         </m:sSubPr>
@@ -3299,7 +3318,7 @@
             </p:txBody>
           </p:sp>
         </mc:Choice>
-        <mc:Fallback>
+        <mc:Fallback xmlns="">
           <p:sp>
             <p:nvSpPr>
               <p:cNvPr id="5" name="TextBox 4"/>
@@ -3342,8 +3361,8 @@
           </p:sp>
         </mc:Fallback>
       </mc:AlternateContent>
-      <mc:AlternateContent xmlns:mc="http://schemas.openxmlformats.org/markup-compatibility/2006">
-        <mc:Choice xmlns:a14="http://schemas.microsoft.com/office/drawing/2010/main" Requires="a14">
+      <mc:AlternateContent xmlns:mc="http://schemas.openxmlformats.org/markup-compatibility/2006" xmlns:a14="http://schemas.microsoft.com/office/drawing/2010/main">
+        <mc:Choice Requires="a14">
           <p:sp>
             <p:nvSpPr>
               <p:cNvPr id="6" name="TextBox 5"/>
@@ -3383,6 +3402,7 @@
               </a:bodyPr>
               <a:lstStyle/>
               <a:p>
+                <a:pPr/>
                 <a14:m>
                   <m:oMathPara xmlns:m="http://schemas.openxmlformats.org/officeDocument/2006/math">
                     <m:oMathParaPr>
@@ -3393,7 +3413,7 @@
                         <m:sSubPr>
                           <m:ctrlPr>
                             <a:rPr lang="en-US" b="0" i="1" smtClean="0">
-                              <a:latin typeface="Cambria Math"/>
+                              <a:latin typeface="Cambria Math" panose="02040503050406030204" pitchFamily="18" charset="0"/>
                             </a:rPr>
                           </m:ctrlPr>
                         </m:sSubPr>
@@ -3425,7 +3445,7 @@
             </p:txBody>
           </p:sp>
         </mc:Choice>
-        <mc:Fallback>
+        <mc:Fallback xmlns="">
           <p:sp>
             <p:nvSpPr>
               <p:cNvPr id="6" name="TextBox 5"/>
@@ -3468,8 +3488,8 @@
           </p:sp>
         </mc:Fallback>
       </mc:AlternateContent>
-      <mc:AlternateContent xmlns:mc="http://schemas.openxmlformats.org/markup-compatibility/2006">
-        <mc:Choice xmlns:a14="http://schemas.microsoft.com/office/drawing/2010/main" Requires="a14">
+      <mc:AlternateContent xmlns:mc="http://schemas.openxmlformats.org/markup-compatibility/2006" xmlns:a14="http://schemas.microsoft.com/office/drawing/2010/main">
+        <mc:Choice Requires="a14">
           <p:sp>
             <p:nvSpPr>
               <p:cNvPr id="7" name="TextBox 6"/>
@@ -3509,6 +3529,7 @@
               </a:bodyPr>
               <a:lstStyle/>
               <a:p>
+                <a:pPr/>
                 <a14:m>
                   <m:oMathPara xmlns:m="http://schemas.openxmlformats.org/officeDocument/2006/math">
                     <m:oMathParaPr>
@@ -3519,7 +3540,7 @@
                         <m:sSubPr>
                           <m:ctrlPr>
                             <a:rPr lang="en-US" b="0" i="1" smtClean="0">
-                              <a:latin typeface="Cambria Math"/>
+                              <a:latin typeface="Cambria Math" panose="02040503050406030204" pitchFamily="18" charset="0"/>
                             </a:rPr>
                           </m:ctrlPr>
                         </m:sSubPr>
@@ -3551,7 +3572,7 @@
             </p:txBody>
           </p:sp>
         </mc:Choice>
-        <mc:Fallback>
+        <mc:Fallback xmlns="">
           <p:sp>
             <p:nvSpPr>
               <p:cNvPr id="7" name="TextBox 6"/>
@@ -3594,8 +3615,8 @@
           </p:sp>
         </mc:Fallback>
       </mc:AlternateContent>
-      <mc:AlternateContent xmlns:mc="http://schemas.openxmlformats.org/markup-compatibility/2006">
-        <mc:Choice xmlns:a14="http://schemas.microsoft.com/office/drawing/2010/main" Requires="a14">
+      <mc:AlternateContent xmlns:mc="http://schemas.openxmlformats.org/markup-compatibility/2006" xmlns:a14="http://schemas.microsoft.com/office/drawing/2010/main">
+        <mc:Choice Requires="a14">
           <p:sp>
             <p:nvSpPr>
               <p:cNvPr id="8" name="TextBox 7"/>
@@ -3635,6 +3656,7 @@
               </a:bodyPr>
               <a:lstStyle/>
               <a:p>
+                <a:pPr/>
                 <a14:m>
                   <m:oMathPara xmlns:m="http://schemas.openxmlformats.org/officeDocument/2006/math">
                     <m:oMathParaPr>
@@ -3645,7 +3667,7 @@
                         <m:sSubPr>
                           <m:ctrlPr>
                             <a:rPr lang="en-US" b="0" i="1" smtClean="0">
-                              <a:latin typeface="Cambria Math"/>
+                              <a:latin typeface="Cambria Math" panose="02040503050406030204" pitchFamily="18" charset="0"/>
                             </a:rPr>
                           </m:ctrlPr>
                         </m:sSubPr>
@@ -3674,7 +3696,7 @@
             </p:txBody>
           </p:sp>
         </mc:Choice>
-        <mc:Fallback>
+        <mc:Fallback xmlns="">
           <p:sp>
             <p:nvSpPr>
               <p:cNvPr id="8" name="TextBox 7"/>
@@ -3717,8 +3739,8 @@
           </p:sp>
         </mc:Fallback>
       </mc:AlternateContent>
-      <mc:AlternateContent xmlns:mc="http://schemas.openxmlformats.org/markup-compatibility/2006">
-        <mc:Choice xmlns:a14="http://schemas.microsoft.com/office/drawing/2010/main" Requires="a14">
+      <mc:AlternateContent xmlns:mc="http://schemas.openxmlformats.org/markup-compatibility/2006" xmlns:a14="http://schemas.microsoft.com/office/drawing/2010/main">
+        <mc:Choice Requires="a14">
           <p:sp>
             <p:nvSpPr>
               <p:cNvPr id="9" name="TextBox 8"/>
@@ -3758,6 +3780,7 @@
               </a:bodyPr>
               <a:lstStyle/>
               <a:p>
+                <a:pPr/>
                 <a14:m>
                   <m:oMathPara xmlns:m="http://schemas.openxmlformats.org/officeDocument/2006/math">
                     <m:oMathParaPr>
@@ -3768,7 +3791,7 @@
                         <m:sSubPr>
                           <m:ctrlPr>
                             <a:rPr lang="en-US" b="0" i="1" smtClean="0">
-                              <a:latin typeface="Cambria Math"/>
+                              <a:latin typeface="Cambria Math" panose="02040503050406030204" pitchFamily="18" charset="0"/>
                             </a:rPr>
                           </m:ctrlPr>
                         </m:sSubPr>
@@ -3797,7 +3820,7 @@
             </p:txBody>
           </p:sp>
         </mc:Choice>
-        <mc:Fallback>
+        <mc:Fallback xmlns="">
           <p:sp>
             <p:nvSpPr>
               <p:cNvPr id="9" name="TextBox 8"/>
@@ -3840,8 +3863,8 @@
           </p:sp>
         </mc:Fallback>
       </mc:AlternateContent>
-      <mc:AlternateContent xmlns:mc="http://schemas.openxmlformats.org/markup-compatibility/2006">
-        <mc:Choice xmlns:a14="http://schemas.microsoft.com/office/drawing/2010/main" Requires="a14">
+      <mc:AlternateContent xmlns:mc="http://schemas.openxmlformats.org/markup-compatibility/2006" xmlns:a14="http://schemas.microsoft.com/office/drawing/2010/main">
+        <mc:Choice Requires="a14">
           <p:sp>
             <p:nvSpPr>
               <p:cNvPr id="10" name="TextBox 9"/>
@@ -3881,6 +3904,7 @@
               </a:bodyPr>
               <a:lstStyle/>
               <a:p>
+                <a:pPr/>
                 <a14:m>
                   <m:oMathPara xmlns:m="http://schemas.openxmlformats.org/officeDocument/2006/math">
                     <m:oMathParaPr>
@@ -3891,7 +3915,7 @@
                         <m:sSubPr>
                           <m:ctrlPr>
                             <a:rPr lang="en-US" b="0" i="1" smtClean="0">
-                              <a:latin typeface="Cambria Math"/>
+                              <a:latin typeface="Cambria Math" panose="02040503050406030204" pitchFamily="18" charset="0"/>
                             </a:rPr>
                           </m:ctrlPr>
                         </m:sSubPr>
@@ -3923,7 +3947,7 @@
             </p:txBody>
           </p:sp>
         </mc:Choice>
-        <mc:Fallback>
+        <mc:Fallback xmlns="">
           <p:sp>
             <p:nvSpPr>
               <p:cNvPr id="10" name="TextBox 9"/>
@@ -4299,8 +4323,8 @@
           </a:fontRef>
         </p:style>
       </p:cxnSp>
-      <mc:AlternateContent xmlns:mc="http://schemas.openxmlformats.org/markup-compatibility/2006">
-        <mc:Choice xmlns:a14="http://schemas.microsoft.com/office/drawing/2010/main" Requires="a14">
+      <mc:AlternateContent xmlns:mc="http://schemas.openxmlformats.org/markup-compatibility/2006" xmlns:a14="http://schemas.microsoft.com/office/drawing/2010/main">
+        <mc:Choice Requires="a14">
           <p:sp>
             <p:nvSpPr>
               <p:cNvPr id="51" name="TextBox 50"/>
@@ -4340,6 +4364,7 @@
               </a:bodyPr>
               <a:lstStyle/>
               <a:p>
+                <a:pPr/>
                 <a14:m>
                   <m:oMathPara xmlns:m="http://schemas.openxmlformats.org/officeDocument/2006/math">
                     <m:oMathParaPr>
@@ -4350,7 +4375,7 @@
                         <m:sSubPr>
                           <m:ctrlPr>
                             <a:rPr lang="en-US" b="0" i="1" smtClean="0">
-                              <a:latin typeface="Cambria Math"/>
+                              <a:latin typeface="Cambria Math" panose="02040503050406030204" pitchFamily="18" charset="0"/>
                             </a:rPr>
                           </m:ctrlPr>
                         </m:sSubPr>
@@ -4379,7 +4404,7 @@
             </p:txBody>
           </p:sp>
         </mc:Choice>
-        <mc:Fallback>
+        <mc:Fallback xmlns="">
           <p:sp>
             <p:nvSpPr>
               <p:cNvPr id="51" name="TextBox 50"/>
@@ -4422,8 +4447,8 @@
           </p:sp>
         </mc:Fallback>
       </mc:AlternateContent>
-      <mc:AlternateContent xmlns:mc="http://schemas.openxmlformats.org/markup-compatibility/2006">
-        <mc:Choice xmlns:a14="http://schemas.microsoft.com/office/drawing/2010/main" Requires="a14">
+      <mc:AlternateContent xmlns:mc="http://schemas.openxmlformats.org/markup-compatibility/2006" xmlns:a14="http://schemas.microsoft.com/office/drawing/2010/main">
+        <mc:Choice Requires="a14">
           <p:sp>
             <p:nvSpPr>
               <p:cNvPr id="52" name="TextBox 51"/>
@@ -4463,6 +4488,7 @@
               </a:bodyPr>
               <a:lstStyle/>
               <a:p>
+                <a:pPr/>
                 <a14:m>
                   <m:oMathPara xmlns:m="http://schemas.openxmlformats.org/officeDocument/2006/math">
                     <m:oMathParaPr>
@@ -4473,7 +4499,7 @@
                         <m:sSubPr>
                           <m:ctrlPr>
                             <a:rPr lang="en-US" b="0" i="1" smtClean="0">
-                              <a:latin typeface="Cambria Math"/>
+                              <a:latin typeface="Cambria Math" panose="02040503050406030204" pitchFamily="18" charset="0"/>
                             </a:rPr>
                           </m:ctrlPr>
                         </m:sSubPr>
@@ -4502,7 +4528,7 @@
             </p:txBody>
           </p:sp>
         </mc:Choice>
-        <mc:Fallback>
+        <mc:Fallback xmlns="">
           <p:sp>
             <p:nvSpPr>
               <p:cNvPr id="52" name="TextBox 51"/>
@@ -4545,8 +4571,8 @@
           </p:sp>
         </mc:Fallback>
       </mc:AlternateContent>
-      <mc:AlternateContent xmlns:mc="http://schemas.openxmlformats.org/markup-compatibility/2006">
-        <mc:Choice xmlns:a14="http://schemas.microsoft.com/office/drawing/2010/main" Requires="a14">
+      <mc:AlternateContent xmlns:mc="http://schemas.openxmlformats.org/markup-compatibility/2006" xmlns:a14="http://schemas.microsoft.com/office/drawing/2010/main">
+        <mc:Choice Requires="a14">
           <p:sp>
             <p:nvSpPr>
               <p:cNvPr id="54" name="TextBox 53"/>
@@ -4586,6 +4612,7 @@
               </a:bodyPr>
               <a:lstStyle/>
               <a:p>
+                <a:pPr/>
                 <a14:m>
                   <m:oMathPara xmlns:m="http://schemas.openxmlformats.org/officeDocument/2006/math">
                     <m:oMathParaPr>
@@ -4596,7 +4623,7 @@
                         <m:sSubPr>
                           <m:ctrlPr>
                             <a:rPr lang="en-US" b="0" i="1" smtClean="0">
-                              <a:latin typeface="Cambria Math"/>
+                              <a:latin typeface="Cambria Math" panose="02040503050406030204" pitchFamily="18" charset="0"/>
                             </a:rPr>
                           </m:ctrlPr>
                         </m:sSubPr>
@@ -4628,7 +4655,7 @@
             </p:txBody>
           </p:sp>
         </mc:Choice>
-        <mc:Fallback>
+        <mc:Fallback xmlns="">
           <p:sp>
             <p:nvSpPr>
               <p:cNvPr id="54" name="TextBox 53"/>
@@ -4671,8 +4698,8 @@
           </p:sp>
         </mc:Fallback>
       </mc:AlternateContent>
-      <mc:AlternateContent xmlns:mc="http://schemas.openxmlformats.org/markup-compatibility/2006">
-        <mc:Choice xmlns:a14="http://schemas.microsoft.com/office/drawing/2010/main" Requires="a14">
+      <mc:AlternateContent xmlns:mc="http://schemas.openxmlformats.org/markup-compatibility/2006" xmlns:a14="http://schemas.microsoft.com/office/drawing/2010/main">
+        <mc:Choice Requires="a14">
           <p:sp>
             <p:nvSpPr>
               <p:cNvPr id="55" name="TextBox 54"/>
@@ -4712,6 +4739,7 @@
               </a:bodyPr>
               <a:lstStyle/>
               <a:p>
+                <a:pPr/>
                 <a14:m>
                   <m:oMathPara xmlns:m="http://schemas.openxmlformats.org/officeDocument/2006/math">
                     <m:oMathParaPr>
@@ -4722,7 +4750,7 @@
                         <m:sSubPr>
                           <m:ctrlPr>
                             <a:rPr lang="en-US" b="0" i="1" smtClean="0">
-                              <a:latin typeface="Cambria Math"/>
+                              <a:latin typeface="Cambria Math" panose="02040503050406030204" pitchFamily="18" charset="0"/>
                             </a:rPr>
                           </m:ctrlPr>
                         </m:sSubPr>
@@ -4751,7 +4779,7 @@
             </p:txBody>
           </p:sp>
         </mc:Choice>
-        <mc:Fallback>
+        <mc:Fallback xmlns="">
           <p:sp>
             <p:nvSpPr>
               <p:cNvPr id="55" name="TextBox 54"/>
@@ -4794,8 +4822,8 @@
           </p:sp>
         </mc:Fallback>
       </mc:AlternateContent>
-      <mc:AlternateContent xmlns:mc="http://schemas.openxmlformats.org/markup-compatibility/2006">
-        <mc:Choice xmlns:a14="http://schemas.microsoft.com/office/drawing/2010/main" Requires="a14">
+      <mc:AlternateContent xmlns:mc="http://schemas.openxmlformats.org/markup-compatibility/2006" xmlns:a14="http://schemas.microsoft.com/office/drawing/2010/main">
+        <mc:Choice Requires="a14">
           <p:sp>
             <p:nvSpPr>
               <p:cNvPr id="56" name="TextBox 55"/>
@@ -4835,6 +4863,7 @@
               </a:bodyPr>
               <a:lstStyle/>
               <a:p>
+                <a:pPr/>
                 <a14:m>
                   <m:oMathPara xmlns:m="http://schemas.openxmlformats.org/officeDocument/2006/math">
                     <m:oMathParaPr>
@@ -4845,7 +4874,7 @@
                         <m:sSubPr>
                           <m:ctrlPr>
                             <a:rPr lang="en-US" b="0" i="1" smtClean="0">
-                              <a:latin typeface="Cambria Math"/>
+                              <a:latin typeface="Cambria Math" panose="02040503050406030204" pitchFamily="18" charset="0"/>
                             </a:rPr>
                           </m:ctrlPr>
                         </m:sSubPr>
@@ -4874,7 +4903,7 @@
             </p:txBody>
           </p:sp>
         </mc:Choice>
-        <mc:Fallback>
+        <mc:Fallback xmlns="">
           <p:sp>
             <p:nvSpPr>
               <p:cNvPr id="56" name="TextBox 55"/>
@@ -4917,8 +4946,8 @@
           </p:sp>
         </mc:Fallback>
       </mc:AlternateContent>
-      <mc:AlternateContent xmlns:mc="http://schemas.openxmlformats.org/markup-compatibility/2006">
-        <mc:Choice xmlns:a14="http://schemas.microsoft.com/office/drawing/2010/main" Requires="a14">
+      <mc:AlternateContent xmlns:mc="http://schemas.openxmlformats.org/markup-compatibility/2006" xmlns:a14="http://schemas.microsoft.com/office/drawing/2010/main">
+        <mc:Choice Requires="a14">
           <p:sp>
             <p:nvSpPr>
               <p:cNvPr id="57" name="TextBox 56"/>
@@ -4958,6 +4987,7 @@
               </a:bodyPr>
               <a:lstStyle/>
               <a:p>
+                <a:pPr/>
                 <a14:m>
                   <m:oMathPara xmlns:m="http://schemas.openxmlformats.org/officeDocument/2006/math">
                     <m:oMathParaPr>
@@ -4968,7 +4998,7 @@
                         <m:sSubPr>
                           <m:ctrlPr>
                             <a:rPr lang="en-US" b="0" i="1" smtClean="0">
-                              <a:latin typeface="Cambria Math"/>
+                              <a:latin typeface="Cambria Math" panose="02040503050406030204" pitchFamily="18" charset="0"/>
                             </a:rPr>
                           </m:ctrlPr>
                         </m:sSubPr>
@@ -5000,7 +5030,7 @@
             </p:txBody>
           </p:sp>
         </mc:Choice>
-        <mc:Fallback>
+        <mc:Fallback xmlns="">
           <p:sp>
             <p:nvSpPr>
               <p:cNvPr id="57" name="TextBox 56"/>
@@ -5458,8 +5488,8 @@
           </a:fontRef>
         </p:style>
       </p:cxnSp>
-      <mc:AlternateContent xmlns:mc="http://schemas.openxmlformats.org/markup-compatibility/2006">
-        <mc:Choice xmlns:a14="http://schemas.microsoft.com/office/drawing/2010/main" Requires="a14">
+      <mc:AlternateContent xmlns:mc="http://schemas.openxmlformats.org/markup-compatibility/2006" xmlns:a14="http://schemas.microsoft.com/office/drawing/2010/main">
+        <mc:Choice Requires="a14">
           <p:sp>
             <p:nvSpPr>
               <p:cNvPr id="114" name="TextBox 113"/>
@@ -5492,7 +5522,7 @@
                       <m:sSubPr>
                         <m:ctrlPr>
                           <a:rPr lang="en-US" sz="1400" b="0" i="1" smtClean="0">
-                            <a:latin typeface="Cambria Math"/>
+                            <a:latin typeface="Cambria Math" panose="02040503050406030204" pitchFamily="18" charset="0"/>
                           </a:rPr>
                         </m:ctrlPr>
                       </m:sSubPr>
@@ -5531,7 +5561,7 @@
                       <m:sSubPr>
                         <m:ctrlPr>
                           <a:rPr lang="en-US" sz="1400" b="0" i="1" smtClean="0">
-                            <a:latin typeface="Cambria Math"/>
+                            <a:latin typeface="Cambria Math" panose="02040503050406030204" pitchFamily="18" charset="0"/>
                           </a:rPr>
                         </m:ctrlPr>
                       </m:sSubPr>
@@ -5559,13 +5589,8 @@
                 </a14:m>
                 <a:r>
                   <a:rPr lang="en-US" sz="1400" dirty="0" smtClean="0"/>
-                  <a:t> : Cluster </a:t>
+                  <a:t> : Cluster covariance</a:t>
                 </a:r>
-                <a:r>
-                  <a:rPr lang="en-US" sz="1400" dirty="0" smtClean="0"/>
-                  <a:t>covariance</a:t>
-                </a:r>
-                <a:endParaRPr lang="en-US" sz="1400" dirty="0" smtClean="0"/>
               </a:p>
               <a:p>
                 <a:pPr marL="285750" indent="-285750">
@@ -5578,7 +5603,7 @@
                       <m:sSubPr>
                         <m:ctrlPr>
                           <a:rPr lang="en-US" sz="1400" b="0" i="1" smtClean="0">
-                            <a:latin typeface="Cambria Math"/>
+                            <a:latin typeface="Cambria Math" panose="02040503050406030204" pitchFamily="18" charset="0"/>
                           </a:rPr>
                         </m:ctrlPr>
                       </m:sSubPr>
@@ -5603,13 +5628,8 @@
                 </a14:m>
                 <a:r>
                   <a:rPr lang="en-US" sz="1400" dirty="0" smtClean="0"/>
-                  <a:t> : Cluster </a:t>
+                  <a:t> : Cluster weight</a:t>
                 </a:r>
-                <a:r>
-                  <a:rPr lang="en-US" sz="1400" dirty="0" smtClean="0"/>
-                  <a:t>weight</a:t>
-                </a:r>
-                <a:endParaRPr lang="en-US" sz="1400" dirty="0" smtClean="0"/>
               </a:p>
               <a:p>
                 <a:pPr marL="285750" indent="-285750">
@@ -5622,7 +5642,7 @@
                       <m:sSubPr>
                         <m:ctrlPr>
                           <a:rPr lang="en-US" sz="1400" b="0" i="1" smtClean="0">
-                            <a:latin typeface="Cambria Math"/>
+                            <a:latin typeface="Cambria Math" panose="02040503050406030204" pitchFamily="18" charset="0"/>
                           </a:rPr>
                         </m:ctrlPr>
                       </m:sSubPr>
@@ -5647,13 +5667,8 @@
                 </a14:m>
                 <a:r>
                   <a:rPr lang="en-US" sz="1400" dirty="0" smtClean="0"/>
-                  <a:t> : </a:t>
+                  <a:t> : Number of component  assigned</a:t>
                 </a:r>
-                <a:r>
-                  <a:rPr lang="en-US" sz="1400" dirty="0" smtClean="0"/>
-                  <a:t>Number of component  assigned</a:t>
-                </a:r>
-                <a:endParaRPr lang="en-US" sz="1400" dirty="0" smtClean="0"/>
               </a:p>
               <a:p>
                 <a:pPr marL="285750" indent="-285750">
@@ -5666,7 +5681,7 @@
                       <m:sSubPr>
                         <m:ctrlPr>
                           <a:rPr lang="en-US" sz="1400" b="0" i="1" smtClean="0">
-                            <a:latin typeface="Cambria Math"/>
+                            <a:latin typeface="Cambria Math" panose="02040503050406030204" pitchFamily="18" charset="0"/>
                           </a:rPr>
                         </m:ctrlPr>
                       </m:sSubPr>
@@ -5699,105 +5714,7 @@
                 </a:r>
                 <a:r>
                   <a:rPr lang="en-US" sz="1400" dirty="0" smtClean="0"/>
-                  <a:t>: </a:t>
-                </a:r>
-                <a:r>
-                  <a:rPr lang="en-US" sz="1400" dirty="0" smtClean="0"/>
-                  <a:t>Sum of component means</a:t>
-                </a:r>
-                <a:endParaRPr lang="en-US" sz="1400" dirty="0" smtClean="0"/>
-              </a:p>
-              <a:p>
-                <a:pPr marL="285750" indent="-285750">
-                  <a:buFont typeface="Arial" panose="020B0604020202020204" pitchFamily="34" charset="0"/>
-                  <a:buChar char="•"/>
-                </a:pPr>
-                <a14:m>
-                  <m:oMath xmlns:m="http://schemas.openxmlformats.org/officeDocument/2006/math">
-                    <m:sSub>
-                      <m:sSubPr>
-                        <m:ctrlPr>
-                          <a:rPr lang="en-US" sz="1400" b="0" i="1" smtClean="0">
-                            <a:latin typeface="Cambria Math"/>
-                          </a:rPr>
-                        </m:ctrlPr>
-                      </m:sSubPr>
-                      <m:e>
-                        <m:r>
-                          <a:rPr lang="en-US" sz="1400" b="0" i="1" smtClean="0">
-                            <a:latin typeface="Cambria Math"/>
-                          </a:rPr>
-                          <m:t>𝑠𝑠</m:t>
-                        </m:r>
-                      </m:e>
-                      <m:sub>
-                        <m:r>
-                          <a:rPr lang="en-US" sz="1400" b="0" i="1" smtClean="0">
-                            <a:latin typeface="Cambria Math"/>
-                          </a:rPr>
-                          <m:t>𝑖</m:t>
-                        </m:r>
-                      </m:sub>
-                    </m:sSub>
-                  </m:oMath>
-                </a14:m>
-                <a:r>
-                  <a:rPr lang="en-US" sz="1400" dirty="0" smtClean="0"/>
-                  <a:t>: </a:t>
-                </a:r>
-                <a:r>
-                  <a:rPr lang="en-US" sz="1400" dirty="0" smtClean="0"/>
-                  <a:t>Scatter of component means</a:t>
-                </a:r>
-                <a:endParaRPr lang="en-US" sz="1400" dirty="0" smtClean="0"/>
-              </a:p>
-              <a:p>
-                <a:pPr marL="285750" indent="-285750">
-                  <a:buFont typeface="Arial" panose="020B0604020202020204" pitchFamily="34" charset="0"/>
-                  <a:buChar char="•"/>
-                </a:pPr>
-                <a14:m>
-                  <m:oMath xmlns:m="http://schemas.openxmlformats.org/officeDocument/2006/math">
-                    <m:sSub>
-                      <m:sSubPr>
-                        <m:ctrlPr>
-                          <a:rPr lang="en-US" sz="1400" b="0" i="1" smtClean="0">
-                            <a:latin typeface="Cambria Math"/>
-                          </a:rPr>
-                        </m:ctrlPr>
-                      </m:sSubPr>
-                      <m:e>
-                        <m:r>
-                          <a:rPr lang="en-US" sz="1400" b="0" i="1" smtClean="0">
-                            <a:latin typeface="Cambria Math"/>
-                          </a:rPr>
-                          <m:t>𝑐</m:t>
-                        </m:r>
-                      </m:e>
-                      <m:sub>
-                        <m:r>
-                          <a:rPr lang="en-US" sz="1400" b="0" i="1" smtClean="0">
-                            <a:latin typeface="Cambria Math"/>
-                          </a:rPr>
-                          <m:t>𝑖</m:t>
-                        </m:r>
-                        <m:r>
-                          <a:rPr lang="en-US" sz="1400" b="0" i="1" smtClean="0">
-                            <a:latin typeface="Cambria Math"/>
-                          </a:rPr>
-                          <m:t>𝑗</m:t>
-                        </m:r>
-                      </m:sub>
-                    </m:sSub>
-                  </m:oMath>
-                </a14:m>
-                <a:r>
-                  <a:rPr lang="en-US" sz="1400" dirty="0" smtClean="0"/>
-                  <a:t> : </a:t>
-                </a:r>
-                <a:r>
-                  <a:rPr lang="en-US" sz="1400" dirty="0" smtClean="0"/>
-                  <a:t>Indicates cluster for each component</a:t>
+                  <a:t>: Sum of component means</a:t>
                 </a:r>
               </a:p>
               <a:p>
@@ -5811,7 +5728,7 @@
                       <m:sSubPr>
                         <m:ctrlPr>
                           <a:rPr lang="en-US" sz="1400" b="0" i="1" smtClean="0">
-                            <a:latin typeface="Cambria Math"/>
+                            <a:latin typeface="Cambria Math" panose="02040503050406030204" pitchFamily="18" charset="0"/>
                           </a:rPr>
                         </m:ctrlPr>
                       </m:sSubPr>
@@ -5820,7 +5737,7 @@
                           <a:rPr lang="en-US" sz="1400" b="0" i="1" smtClean="0">
                             <a:latin typeface="Cambria Math"/>
                           </a:rPr>
-                          <m:t>𝜇</m:t>
+                          <m:t>𝑠𝑠</m:t>
                         </m:r>
                       </m:e>
                       <m:sub>
@@ -5829,12 +5746,6 @@
                             <a:latin typeface="Cambria Math"/>
                           </a:rPr>
                           <m:t>𝑖</m:t>
-                        </m:r>
-                        <m:r>
-                          <a:rPr lang="en-US" sz="1400" b="0" i="1" smtClean="0">
-                            <a:latin typeface="Cambria Math"/>
-                          </a:rPr>
-                          <m:t>𝑗</m:t>
                         </m:r>
                       </m:sub>
                     </m:sSub>
@@ -5842,13 +5753,8 @@
                 </a14:m>
                 <a:r>
                   <a:rPr lang="en-US" sz="1400" dirty="0" smtClean="0"/>
-                  <a:t> : </a:t>
+                  <a:t>: Scatter of component means</a:t>
                 </a:r>
-                <a:r>
-                  <a:rPr lang="en-US" sz="1400" dirty="0" smtClean="0"/>
-                  <a:t>Component mean</a:t>
-                </a:r>
-                <a:endParaRPr lang="en-US" sz="1400" dirty="0" smtClean="0"/>
               </a:p>
               <a:p>
                 <a:pPr marL="285750" indent="-285750">
@@ -5861,7 +5767,7 @@
                       <m:sSubPr>
                         <m:ctrlPr>
                           <a:rPr lang="en-US" sz="1400" b="0" i="1" smtClean="0">
-                            <a:latin typeface="Cambria Math"/>
+                            <a:latin typeface="Cambria Math" panose="02040503050406030204" pitchFamily="18" charset="0"/>
                           </a:rPr>
                         </m:ctrlPr>
                       </m:sSubPr>
@@ -5870,7 +5776,7 @@
                           <a:rPr lang="en-US" sz="1400" b="0" i="1" smtClean="0">
                             <a:latin typeface="Cambria Math"/>
                           </a:rPr>
-                          <m:t>𝛽</m:t>
+                          <m:t>𝑐</m:t>
                         </m:r>
                       </m:e>
                       <m:sub>
@@ -5886,13 +5792,8 @@
                 </a14:m>
                 <a:r>
                   <a:rPr lang="en-US" sz="1400" dirty="0" smtClean="0"/>
-                  <a:t> : </a:t>
+                  <a:t> : Indicates cluster for each component</a:t>
                 </a:r>
-                <a:r>
-                  <a:rPr lang="en-US" sz="1400" dirty="0" smtClean="0"/>
-                  <a:t>Component weight</a:t>
-                </a:r>
-                <a:endParaRPr lang="en-US" sz="1400" dirty="0" smtClean="0"/>
               </a:p>
               <a:p>
                 <a:pPr marL="285750" indent="-285750">
@@ -5905,7 +5806,7 @@
                       <m:sSubPr>
                         <m:ctrlPr>
                           <a:rPr lang="en-US" sz="1400" b="0" i="1" smtClean="0">
-                            <a:latin typeface="Cambria Math"/>
+                            <a:latin typeface="Cambria Math" panose="02040503050406030204" pitchFamily="18" charset="0"/>
                           </a:rPr>
                         </m:ctrlPr>
                       </m:sSubPr>
@@ -5914,7 +5815,7 @@
                           <a:rPr lang="en-US" sz="1400" b="0" i="1" smtClean="0">
                             <a:latin typeface="Cambria Math"/>
                           </a:rPr>
-                          <m:t>𝑛</m:t>
+                          <m:t>𝜇</m:t>
                         </m:r>
                       </m:e>
                       <m:sub>
@@ -5930,13 +5831,8 @@
                 </a14:m>
                 <a:r>
                   <a:rPr lang="en-US" sz="1400" dirty="0" smtClean="0"/>
-                  <a:t> : </a:t>
+                  <a:t> : Component mean</a:t>
                 </a:r>
-                <a:r>
-                  <a:rPr lang="en-US" sz="1400" dirty="0" smtClean="0"/>
-                  <a:t>Number of points assigned to comp</a:t>
-                </a:r>
-                <a:endParaRPr lang="en-US" sz="1400" dirty="0" smtClean="0"/>
               </a:p>
               <a:p>
                 <a:pPr marL="285750" indent="-285750">
@@ -5949,7 +5845,7 @@
                       <m:sSubPr>
                         <m:ctrlPr>
                           <a:rPr lang="en-US" sz="1400" b="0" i="1" smtClean="0">
-                            <a:latin typeface="Cambria Math"/>
+                            <a:latin typeface="Cambria Math" panose="02040503050406030204" pitchFamily="18" charset="0"/>
                           </a:rPr>
                         </m:ctrlPr>
                       </m:sSubPr>
@@ -5958,7 +5854,7 @@
                           <a:rPr lang="en-US" sz="1400" b="0" i="1" smtClean="0">
                             <a:latin typeface="Cambria Math"/>
                           </a:rPr>
-                          <m:t>𝑠</m:t>
+                          <m:t>𝛽</m:t>
                         </m:r>
                       </m:e>
                       <m:sub>
@@ -5974,13 +5870,86 @@
                 </a14:m>
                 <a:r>
                   <a:rPr lang="en-US" sz="1400" dirty="0" smtClean="0"/>
-                  <a:t> : </a:t>
+                  <a:t> : Component weight</a:t>
                 </a:r>
+              </a:p>
+              <a:p>
+                <a:pPr marL="285750" indent="-285750">
+                  <a:buFont typeface="Arial" panose="020B0604020202020204" pitchFamily="34" charset="0"/>
+                  <a:buChar char="•"/>
+                </a:pPr>
+                <a14:m>
+                  <m:oMath xmlns:m="http://schemas.openxmlformats.org/officeDocument/2006/math">
+                    <m:sSub>
+                      <m:sSubPr>
+                        <m:ctrlPr>
+                          <a:rPr lang="en-US" sz="1400" b="0" i="1" smtClean="0">
+                            <a:latin typeface="Cambria Math" panose="02040503050406030204" pitchFamily="18" charset="0"/>
+                          </a:rPr>
+                        </m:ctrlPr>
+                      </m:sSubPr>
+                      <m:e>
+                        <m:r>
+                          <a:rPr lang="en-US" sz="1400" b="0" i="1" smtClean="0">
+                            <a:latin typeface="Cambria Math"/>
+                          </a:rPr>
+                          <m:t>𝑛</m:t>
+                        </m:r>
+                      </m:e>
+                      <m:sub>
+                        <m:r>
+                          <a:rPr lang="en-US" sz="1400" b="0" i="1" smtClean="0">
+                            <a:latin typeface="Cambria Math"/>
+                          </a:rPr>
+                          <m:t>𝑖𝑗</m:t>
+                        </m:r>
+                      </m:sub>
+                    </m:sSub>
+                  </m:oMath>
+                </a14:m>
                 <a:r>
                   <a:rPr lang="en-US" sz="1400" dirty="0" smtClean="0"/>
-                  <a:t>Sum of data points assigned to comp</a:t>
+                  <a:t> : Number of points assigned to comp</a:t>
                 </a:r>
-                <a:endParaRPr lang="en-US" sz="1400" dirty="0" smtClean="0"/>
+              </a:p>
+              <a:p>
+                <a:pPr marL="285750" indent="-285750">
+                  <a:buFont typeface="Arial" panose="020B0604020202020204" pitchFamily="34" charset="0"/>
+                  <a:buChar char="•"/>
+                </a:pPr>
+                <a14:m>
+                  <m:oMath xmlns:m="http://schemas.openxmlformats.org/officeDocument/2006/math">
+                    <m:sSub>
+                      <m:sSubPr>
+                        <m:ctrlPr>
+                          <a:rPr lang="en-US" sz="1400" b="0" i="1" smtClean="0">
+                            <a:latin typeface="Cambria Math" panose="02040503050406030204" pitchFamily="18" charset="0"/>
+                          </a:rPr>
+                        </m:ctrlPr>
+                      </m:sSubPr>
+                      <m:e>
+                        <m:r>
+                          <a:rPr lang="en-US" sz="1400" b="0" i="1" smtClean="0">
+                            <a:latin typeface="Cambria Math"/>
+                          </a:rPr>
+                          <m:t>𝑠</m:t>
+                        </m:r>
+                      </m:e>
+                      <m:sub>
+                        <m:r>
+                          <a:rPr lang="en-US" sz="1400" b="0" i="1" smtClean="0">
+                            <a:latin typeface="Cambria Math"/>
+                          </a:rPr>
+                          <m:t>𝑖𝑗</m:t>
+                        </m:r>
+                      </m:sub>
+                    </m:sSub>
+                  </m:oMath>
+                </a14:m>
+                <a:r>
+                  <a:rPr lang="en-US" sz="1400" dirty="0" smtClean="0"/>
+                  <a:t> : Sum of data points assigned to comp</a:t>
+                </a:r>
               </a:p>
               <a:p>
                 <a:pPr marL="285750" indent="-285750">
@@ -5999,7 +5968,7 @@
                       <m:sSubPr>
                         <m:ctrlPr>
                           <a:rPr lang="en-US" sz="1400" b="0" i="1" smtClean="0">
-                            <a:latin typeface="Cambria Math"/>
+                            <a:latin typeface="Cambria Math" panose="02040503050406030204" pitchFamily="18" charset="0"/>
                           </a:rPr>
                         </m:ctrlPr>
                       </m:sSubPr>
@@ -6024,13 +5993,8 @@
                 </a14:m>
                 <a:r>
                   <a:rPr lang="en-US" sz="1400" dirty="0" smtClean="0"/>
-                  <a:t> : </a:t>
+                  <a:t> : Scatter of data points assigned</a:t>
                 </a:r>
-                <a:r>
-                  <a:rPr lang="en-US" sz="1400" dirty="0" smtClean="0"/>
-                  <a:t>Scatter of data points assigned</a:t>
-                </a:r>
-                <a:endParaRPr lang="en-US" sz="1400" dirty="0" smtClean="0"/>
               </a:p>
               <a:p>
                 <a:pPr marL="285750" indent="-285750">
@@ -6043,7 +6007,7 @@
                       <m:sSubPr>
                         <m:ctrlPr>
                           <a:rPr lang="en-US" sz="1400" b="0" i="1" smtClean="0">
-                            <a:latin typeface="Cambria Math"/>
+                            <a:latin typeface="Cambria Math" panose="02040503050406030204" pitchFamily="18" charset="0"/>
                           </a:rPr>
                         </m:ctrlPr>
                       </m:sSubPr>
@@ -6068,13 +6032,8 @@
                 </a14:m>
                 <a:r>
                   <a:rPr lang="en-US" sz="1400" dirty="0" smtClean="0"/>
-                  <a:t> : </a:t>
+                  <a:t> : Component indicator for each data</a:t>
                 </a:r>
-                <a:r>
-                  <a:rPr lang="en-US" sz="1400" dirty="0" smtClean="0"/>
-                  <a:t>Component indicator for each data</a:t>
-                </a:r>
-                <a:endParaRPr lang="en-US" sz="1400" dirty="0" smtClean="0"/>
               </a:p>
               <a:p>
                 <a:pPr marL="285750" indent="-285750">
@@ -6087,7 +6046,7 @@
                       <m:sSubPr>
                         <m:ctrlPr>
                           <a:rPr lang="en-US" sz="1400" b="0" i="1" smtClean="0">
-                            <a:latin typeface="Cambria Math"/>
+                            <a:latin typeface="Cambria Math" panose="02040503050406030204" pitchFamily="18" charset="0"/>
                           </a:rPr>
                         </m:ctrlPr>
                       </m:sSubPr>
@@ -6112,11 +6071,7 @@
                 </a14:m>
                 <a:r>
                   <a:rPr lang="en-US" sz="1400" dirty="0" smtClean="0"/>
-                  <a:t> : Cluster </a:t>
-                </a:r>
-                <a:r>
-                  <a:rPr lang="en-US" sz="1400" dirty="0" smtClean="0"/>
-                  <a:t>center</a:t>
+                  <a:t> : Cluster center</a:t>
                 </a:r>
               </a:p>
               <a:p>
@@ -6156,7 +6111,7 @@
             </p:txBody>
           </p:sp>
         </mc:Choice>
-        <mc:Fallback>
+        <mc:Fallback xmlns="">
           <p:sp>
             <p:nvSpPr>
               <p:cNvPr id="114" name="TextBox 113"/>
@@ -6195,8 +6150,8 @@
           </p:sp>
         </mc:Fallback>
       </mc:AlternateContent>
-      <mc:AlternateContent xmlns:mc="http://schemas.openxmlformats.org/markup-compatibility/2006">
-        <mc:Choice xmlns:a14="http://schemas.microsoft.com/office/drawing/2010/main" Requires="a14">
+      <mc:AlternateContent xmlns:mc="http://schemas.openxmlformats.org/markup-compatibility/2006" xmlns:a14="http://schemas.microsoft.com/office/drawing/2010/main">
+        <mc:Choice Requires="a14">
           <p:sp>
             <p:nvSpPr>
               <p:cNvPr id="115" name="Rectangle 114"/>
@@ -6218,6 +6173,7 @@
               </a:bodyPr>
               <a:lstStyle/>
               <a:p>
+                <a:pPr/>
                 <a14:m>
                   <m:oMathPara xmlns:m="http://schemas.openxmlformats.org/officeDocument/2006/math">
                     <m:oMathParaPr>
@@ -6238,7 +6194,7 @@
             </p:txBody>
           </p:sp>
         </mc:Choice>
-        <mc:Fallback>
+        <mc:Fallback xmlns="">
           <p:sp>
             <p:nvSpPr>
               <p:cNvPr id="115" name="Rectangle 114"/>
@@ -6441,8 +6397,8 @@
           </a:p>
         </p:txBody>
       </p:sp>
-      <mc:AlternateContent xmlns:mc="http://schemas.openxmlformats.org/markup-compatibility/2006">
-        <mc:Choice xmlns:a14="http://schemas.microsoft.com/office/drawing/2010/main" Requires="a14">
+      <mc:AlternateContent xmlns:mc="http://schemas.openxmlformats.org/markup-compatibility/2006" xmlns:a14="http://schemas.microsoft.com/office/drawing/2010/main">
+        <mc:Choice Requires="a14">
           <p:sp>
             <p:nvSpPr>
               <p:cNvPr id="3" name="Content Placeholder 2"/>
@@ -6482,7 +6438,7 @@
                       <m:sSubPr>
                         <m:ctrlPr>
                           <a:rPr lang="en-US" sz="1800" b="0" i="1" smtClean="0">
-                            <a:latin typeface="Cambria Math"/>
+                            <a:latin typeface="Cambria Math" panose="02040503050406030204" pitchFamily="18" charset="0"/>
                           </a:rPr>
                         </m:ctrlPr>
                       </m:sSubPr>
@@ -6522,7 +6478,7 @@
                       <m:sSubPr>
                         <m:ctrlPr>
                           <a:rPr lang="en-US" sz="1800" b="0" i="1" smtClean="0">
-                            <a:latin typeface="Cambria Math"/>
+                            <a:latin typeface="Cambria Math" panose="02040503050406030204" pitchFamily="18" charset="0"/>
                           </a:rPr>
                         </m:ctrlPr>
                       </m:sSubPr>
@@ -6559,11 +6515,7 @@
                 </a14:m>
                 <a:r>
                   <a:rPr lang="en-US" sz="1800" dirty="0" smtClean="0"/>
-                  <a:t> </a:t>
-                </a:r>
-                <a:r>
-                  <a:rPr lang="en-US" sz="1800" dirty="0" smtClean="0"/>
-                  <a:t>-&gt; Intermediate no need to store</a:t>
+                  <a:t> -&gt; Intermediate no need to store</a:t>
                 </a:r>
               </a:p>
               <a:p>
@@ -6578,7 +6530,7 @@
                       <m:sSubPr>
                         <m:ctrlPr>
                           <a:rPr lang="en-US" sz="1800" b="0" i="1" smtClean="0">
-                            <a:latin typeface="Cambria Math"/>
+                            <a:latin typeface="Cambria Math" panose="02040503050406030204" pitchFamily="18" charset="0"/>
                           </a:rPr>
                         </m:ctrlPr>
                       </m:sSubPr>
@@ -6624,7 +6576,7 @@
                       <m:sSubPr>
                         <m:ctrlPr>
                           <a:rPr lang="en-US" sz="1800" b="0" i="1" smtClean="0">
-                            <a:latin typeface="Cambria Math"/>
+                            <a:latin typeface="Cambria Math" panose="02040503050406030204" pitchFamily="18" charset="0"/>
                           </a:rPr>
                         </m:ctrlPr>
                       </m:sSubPr>
@@ -6657,7 +6609,7 @@
                       <m:sSubPr>
                         <m:ctrlPr>
                           <a:rPr lang="en-US" sz="1800" b="0" i="1" smtClean="0">
-                            <a:latin typeface="Cambria Math"/>
+                            <a:latin typeface="Cambria Math" panose="02040503050406030204" pitchFamily="18" charset="0"/>
                           </a:rPr>
                         </m:ctrlPr>
                       </m:sSubPr>
@@ -6694,7 +6646,7 @@
                       <m:sSubPr>
                         <m:ctrlPr>
                           <a:rPr lang="en-US" sz="1800" b="0" i="1" smtClean="0">
-                            <a:latin typeface="Cambria Math"/>
+                            <a:latin typeface="Cambria Math" panose="02040503050406030204" pitchFamily="18" charset="0"/>
                           </a:rPr>
                         </m:ctrlPr>
                       </m:sSubPr>
@@ -6703,13 +6655,7 @@
                           <a:rPr lang="en-US" sz="1800" b="0" i="1" smtClean="0">
                             <a:latin typeface="Cambria Math"/>
                           </a:rPr>
-                          <m:t>𝑠</m:t>
-                        </m:r>
-                        <m:r>
-                          <a:rPr lang="en-US" sz="1800" b="0" i="1" smtClean="0">
-                            <a:latin typeface="Cambria Math"/>
-                          </a:rPr>
-                          <m:t>𝑠</m:t>
+                          <m:t>𝑠𝑠</m:t>
                         </m:r>
                       </m:e>
                       <m:sub>
@@ -6736,7 +6682,7 @@
                       <m:sSubPr>
                         <m:ctrlPr>
                           <a:rPr lang="en-US" sz="1800" b="0" i="1" smtClean="0">
-                            <a:latin typeface="Cambria Math"/>
+                            <a:latin typeface="Cambria Math" panose="02040503050406030204" pitchFamily="18" charset="0"/>
                           </a:rPr>
                         </m:ctrlPr>
                       </m:sSubPr>
@@ -6769,7 +6715,7 @@
                       <m:sSubPr>
                         <m:ctrlPr>
                           <a:rPr lang="en-US" sz="1800" b="0" i="1" smtClean="0">
-                            <a:latin typeface="Cambria Math"/>
+                            <a:latin typeface="Cambria Math" panose="02040503050406030204" pitchFamily="18" charset="0"/>
                           </a:rPr>
                         </m:ctrlPr>
                       </m:sSubPr>
@@ -6813,7 +6759,7 @@
                       <m:sSubPr>
                         <m:ctrlPr>
                           <a:rPr lang="en-US" sz="1800" b="0" i="1" smtClean="0">
-                            <a:latin typeface="Cambria Math"/>
+                            <a:latin typeface="Cambria Math" panose="02040503050406030204" pitchFamily="18" charset="0"/>
                           </a:rPr>
                         </m:ctrlPr>
                       </m:sSubPr>
@@ -6838,11 +6784,7 @@
                 </a14:m>
                 <a:r>
                   <a:rPr lang="en-US" sz="1800" dirty="0" smtClean="0"/>
-                  <a:t>,</a:t>
-                </a:r>
-                <a:r>
-                  <a:rPr lang="en-US" sz="1800" dirty="0" smtClean="0"/>
-                  <a:t> </a:t>
+                  <a:t>, </a:t>
                 </a:r>
                 <a14:m>
                   <m:oMath xmlns:m="http://schemas.openxmlformats.org/officeDocument/2006/math">
@@ -6850,7 +6792,7 @@
                       <m:sSubPr>
                         <m:ctrlPr>
                           <a:rPr lang="en-US" sz="1800" b="0" i="1" smtClean="0">
-                            <a:latin typeface="Cambria Math"/>
+                            <a:latin typeface="Cambria Math" panose="02040503050406030204" pitchFamily="18" charset="0"/>
                           </a:rPr>
                         </m:ctrlPr>
                       </m:sSubPr>
@@ -6887,7 +6829,7 @@
                       <m:sSubPr>
                         <m:ctrlPr>
                           <a:rPr lang="en-US" sz="1800" b="0" i="1" smtClean="0">
-                            <a:latin typeface="Cambria Math"/>
+                            <a:latin typeface="Cambria Math" panose="02040503050406030204" pitchFamily="18" charset="0"/>
                           </a:rPr>
                         </m:ctrlPr>
                       </m:sSubPr>
@@ -6923,7 +6865,7 @@
                       <m:sSubPr>
                         <m:ctrlPr>
                           <a:rPr lang="en-US" sz="1800" b="0" i="1" smtClean="0">
-                            <a:latin typeface="Cambria Math"/>
+                            <a:latin typeface="Cambria Math" panose="02040503050406030204" pitchFamily="18" charset="0"/>
                           </a:rPr>
                         </m:ctrlPr>
                       </m:sSubPr>
@@ -6978,7 +6920,7 @@
                       <m:sSubPr>
                         <m:ctrlPr>
                           <a:rPr lang="en-US" sz="1400" b="0" i="1" smtClean="0">
-                            <a:latin typeface="Cambria Math"/>
+                            <a:latin typeface="Cambria Math" panose="02040503050406030204" pitchFamily="18" charset="0"/>
                           </a:rPr>
                         </m:ctrlPr>
                       </m:sSubPr>
@@ -7017,7 +6959,7 @@
                       <m:sSubPr>
                         <m:ctrlPr>
                           <a:rPr lang="en-US" sz="1400" b="0" i="1" smtClean="0">
-                            <a:latin typeface="Cambria Math"/>
+                            <a:latin typeface="Cambria Math" panose="02040503050406030204" pitchFamily="18" charset="0"/>
                           </a:rPr>
                         </m:ctrlPr>
                       </m:sSubPr>
@@ -7050,7 +6992,7 @@
                       <m:sSubPr>
                         <m:ctrlPr>
                           <a:rPr lang="en-US" sz="1400" b="0" i="1" smtClean="0">
-                            <a:latin typeface="Cambria Math"/>
+                            <a:latin typeface="Cambria Math" panose="02040503050406030204" pitchFamily="18" charset="0"/>
                           </a:rPr>
                         </m:ctrlPr>
                       </m:sSubPr>
@@ -7087,7 +7029,7 @@
                       <m:sSubPr>
                         <m:ctrlPr>
                           <a:rPr lang="en-US" sz="1400" b="0" i="1" smtClean="0">
-                            <a:latin typeface="Cambria Math"/>
+                            <a:latin typeface="Cambria Math" panose="02040503050406030204" pitchFamily="18" charset="0"/>
                           </a:rPr>
                         </m:ctrlPr>
                       </m:sSubPr>
@@ -7124,7 +7066,7 @@
                       <m:sSubPr>
                         <m:ctrlPr>
                           <a:rPr lang="en-US" sz="1400" b="0" i="1" smtClean="0">
-                            <a:latin typeface="Cambria Math"/>
+                            <a:latin typeface="Cambria Math" panose="02040503050406030204" pitchFamily="18" charset="0"/>
                           </a:rPr>
                         </m:ctrlPr>
                       </m:sSubPr>
@@ -7161,7 +7103,7 @@
                       <m:sSubPr>
                         <m:ctrlPr>
                           <a:rPr lang="en-US" sz="1400" b="0" i="1" smtClean="0">
-                            <a:latin typeface="Cambria Math"/>
+                            <a:latin typeface="Cambria Math" panose="02040503050406030204" pitchFamily="18" charset="0"/>
                           </a:rPr>
                         </m:ctrlPr>
                       </m:sSubPr>
@@ -7200,7 +7142,7 @@
                       <m:sSubPr>
                         <m:ctrlPr>
                           <a:rPr lang="en-US" sz="1400" b="0" i="1" smtClean="0">
-                            <a:latin typeface="Cambria Math"/>
+                            <a:latin typeface="Cambria Math" panose="02040503050406030204" pitchFamily="18" charset="0"/>
                           </a:rPr>
                         </m:ctrlPr>
                       </m:sSubPr>
@@ -7234,7 +7176,7 @@
                       <m:sSubPr>
                         <m:ctrlPr>
                           <a:rPr lang="en-US" sz="1400" b="0" i="1" smtClean="0">
-                            <a:latin typeface="Cambria Math"/>
+                            <a:latin typeface="Cambria Math" panose="02040503050406030204" pitchFamily="18" charset="0"/>
                           </a:rPr>
                         </m:ctrlPr>
                       </m:sSubPr>
@@ -7267,7 +7209,7 @@
                       <m:sSubPr>
                         <m:ctrlPr>
                           <a:rPr lang="en-US" sz="1400" b="0" i="1" smtClean="0">
-                            <a:latin typeface="Cambria Math"/>
+                            <a:latin typeface="Cambria Math" panose="02040503050406030204" pitchFamily="18" charset="0"/>
                           </a:rPr>
                         </m:ctrlPr>
                       </m:sSubPr>
@@ -7304,7 +7246,7 @@
                       <m:sSubPr>
                         <m:ctrlPr>
                           <a:rPr lang="en-US" sz="1400" b="0" i="1" smtClean="0">
-                            <a:latin typeface="Cambria Math"/>
+                            <a:latin typeface="Cambria Math" panose="02040503050406030204" pitchFamily="18" charset="0"/>
                           </a:rPr>
                         </m:ctrlPr>
                       </m:sSubPr>
@@ -7341,7 +7283,7 @@
                       <m:sSubPr>
                         <m:ctrlPr>
                           <a:rPr lang="en-US" sz="1400" b="0" i="1" smtClean="0">
-                            <a:latin typeface="Cambria Math"/>
+                            <a:latin typeface="Cambria Math" panose="02040503050406030204" pitchFamily="18" charset="0"/>
                           </a:rPr>
                         </m:ctrlPr>
                       </m:sSubPr>
@@ -7375,7 +7317,7 @@
             </p:txBody>
           </p:sp>
         </mc:Choice>
-        <mc:Fallback>
+        <mc:Fallback xmlns="">
           <p:sp>
             <p:nvSpPr>
               <p:cNvPr id="3" name="Content Placeholder 2"/>
@@ -7417,6 +7359,340 @@
     <p:extLst>
       <p:ext uri="{BB962C8B-B14F-4D97-AF65-F5344CB8AC3E}">
         <p14:creationId xmlns:p14="http://schemas.microsoft.com/office/powerpoint/2010/main" val="2483007612"/>
+      </p:ext>
+    </p:extLst>
+  </p:cSld>
+  <p:clrMapOvr>
+    <a:masterClrMapping/>
+  </p:clrMapOvr>
+</p:sld>
+</file>
+
+<file path=ppt/slides/slide3.xml><?xml version="1.0" encoding="utf-8"?>
+<p:sld xmlns:a="http://schemas.openxmlformats.org/drawingml/2006/main" xmlns:r="http://schemas.openxmlformats.org/officeDocument/2006/relationships" xmlns:p="http://schemas.openxmlformats.org/presentationml/2006/main">
+  <p:cSld>
+    <p:spTree>
+      <p:nvGrpSpPr>
+        <p:cNvPr id="1" name=""/>
+        <p:cNvGrpSpPr/>
+        <p:nvPr/>
+      </p:nvGrpSpPr>
+      <p:grpSpPr>
+        <a:xfrm>
+          <a:off x="0" y="0"/>
+          <a:ext cx="0" cy="0"/>
+          <a:chOff x="0" y="0"/>
+          <a:chExt cx="0" cy="0"/>
+        </a:xfrm>
+      </p:grpSpPr>
+      <p:sp>
+        <p:nvSpPr>
+          <p:cNvPr id="2" name="Title 1"/>
+          <p:cNvSpPr>
+            <a:spLocks noGrp="1"/>
+          </p:cNvSpPr>
+          <p:nvPr>
+            <p:ph type="title"/>
+          </p:nvPr>
+        </p:nvSpPr>
+        <p:spPr/>
+        <p:txBody>
+          <a:bodyPr/>
+          <a:lstStyle/>
+          <a:p>
+            <a:r>
+              <a:rPr lang="en-US" dirty="0" smtClean="0"/>
+              <a:t>Distributions</a:t>
+            </a:r>
+            <a:endParaRPr lang="en-US" dirty="0"/>
+          </a:p>
+        </p:txBody>
+      </p:sp>
+      <mc:AlternateContent xmlns:mc="http://schemas.openxmlformats.org/markup-compatibility/2006">
+        <mc:Choice xmlns:a14="http://schemas.microsoft.com/office/drawing/2010/main" Requires="a14">
+          <p:sp>
+            <p:nvSpPr>
+              <p:cNvPr id="3" name="Content Placeholder 2"/>
+              <p:cNvSpPr>
+                <a:spLocks noGrp="1"/>
+              </p:cNvSpPr>
+              <p:nvPr>
+                <p:ph idx="1"/>
+              </p:nvPr>
+            </p:nvSpPr>
+            <p:spPr/>
+            <p:txBody>
+              <a:bodyPr/>
+              <a:lstStyle/>
+              <a:p>
+                <a14:m>
+                  <m:oMath xmlns:m="http://schemas.openxmlformats.org/officeDocument/2006/math">
+                    <m:sSub>
+                      <m:sSubPr>
+                        <m:ctrlPr>
+                          <a:rPr lang="en-US" i="1" smtClean="0">
+                            <a:latin typeface="Cambria Math" panose="02040503050406030204" pitchFamily="18" charset="0"/>
+                          </a:rPr>
+                        </m:ctrlPr>
+                      </m:sSubPr>
+                      <m:e>
+                        <m:r>
+                          <a:rPr lang="en-US" i="1">
+                            <a:latin typeface="Cambria Math"/>
+                          </a:rPr>
+                          <m:t>𝜇</m:t>
+                        </m:r>
+                      </m:e>
+                      <m:sub>
+                        <m:r>
+                          <a:rPr lang="en-US" i="1">
+                            <a:latin typeface="Cambria Math"/>
+                          </a:rPr>
+                          <m:t>𝑖𝑗</m:t>
+                        </m:r>
+                      </m:sub>
+                    </m:sSub>
+                  </m:oMath>
+                </a14:m>
+                <a:r>
+                  <a:rPr lang="en-US" dirty="0" smtClean="0"/>
+                  <a:t> ~ N(</a:t>
+                </a:r>
+                <a14:m>
+                  <m:oMath xmlns:m="http://schemas.openxmlformats.org/officeDocument/2006/math">
+                    <m:sSub>
+                      <m:sSubPr>
+                        <m:ctrlPr>
+                          <a:rPr lang="en-US" i="1">
+                            <a:latin typeface="Cambria Math" panose="02040503050406030204" pitchFamily="18" charset="0"/>
+                          </a:rPr>
+                        </m:ctrlPr>
+                      </m:sSubPr>
+                      <m:e>
+                        <m:r>
+                          <a:rPr lang="en-US" i="1">
+                            <a:latin typeface="Cambria Math"/>
+                          </a:rPr>
+                          <m:t>𝜇</m:t>
+                        </m:r>
+                      </m:e>
+                      <m:sub>
+                        <m:r>
+                          <a:rPr lang="en-US" i="1">
+                            <a:latin typeface="Cambria Math"/>
+                          </a:rPr>
+                          <m:t>𝑖</m:t>
+                        </m:r>
+                      </m:sub>
+                    </m:sSub>
+                  </m:oMath>
+                </a14:m>
+                <a:r>
+                  <a:rPr lang="en-US" dirty="0" smtClean="0"/>
+                  <a:t>,</a:t>
+                </a:r>
+                <a:r>
+                  <a:rPr lang="en-US" dirty="0"/>
+                  <a:t> </a:t>
+                </a:r>
+                <a14:m>
+                  <m:oMath xmlns:m="http://schemas.openxmlformats.org/officeDocument/2006/math">
+                    <m:sSub>
+                      <m:sSubPr>
+                        <m:ctrlPr>
+                          <a:rPr lang="en-US" b="0" i="1" smtClean="0">
+                            <a:latin typeface="Cambria Math" panose="02040503050406030204" pitchFamily="18" charset="0"/>
+                          </a:rPr>
+                        </m:ctrlPr>
+                      </m:sSubPr>
+                      <m:e>
+                        <m:r>
+                          <m:rPr>
+                            <m:sty m:val="p"/>
+                          </m:rPr>
+                          <a:rPr lang="en-US" b="0" i="0" smtClean="0">
+                            <a:latin typeface="Cambria Math" panose="02040503050406030204" pitchFamily="18" charset="0"/>
+                          </a:rPr>
+                          <m:t>Σ</m:t>
+                        </m:r>
+                      </m:e>
+                      <m:sub>
+                        <m:r>
+                          <a:rPr lang="en-US" b="0" i="1" smtClean="0">
+                            <a:latin typeface="Cambria Math" panose="02040503050406030204" pitchFamily="18" charset="0"/>
+                          </a:rPr>
+                          <m:t>𝑖</m:t>
+                        </m:r>
+                      </m:sub>
+                    </m:sSub>
+                  </m:oMath>
+                </a14:m>
+                <a:r>
+                  <a:rPr lang="en-US" dirty="0" smtClean="0"/>
+                  <a:t>/</a:t>
+                </a:r>
+                <a14:m>
+                  <m:oMath xmlns:m="http://schemas.openxmlformats.org/officeDocument/2006/math">
+                    <m:sSub>
+                      <m:sSubPr>
+                        <m:ctrlPr>
+                          <a:rPr lang="en-US" i="1" smtClean="0">
+                            <a:latin typeface="Cambria Math" panose="02040503050406030204" pitchFamily="18" charset="0"/>
+                          </a:rPr>
+                        </m:ctrlPr>
+                      </m:sSubPr>
+                      <m:e>
+                        <m:r>
+                          <a:rPr lang="en-US" b="0" i="1" smtClean="0">
+                            <a:latin typeface="Cambria Math" panose="02040503050406030204" pitchFamily="18" charset="0"/>
+                          </a:rPr>
+                          <m:t>𝜅</m:t>
+                        </m:r>
+                      </m:e>
+                      <m:sub>
+                        <m:r>
+                          <a:rPr lang="en-US" b="0" i="1" smtClean="0">
+                            <a:latin typeface="Cambria Math" panose="02040503050406030204" pitchFamily="18" charset="0"/>
+                          </a:rPr>
+                          <m:t>1</m:t>
+                        </m:r>
+                      </m:sub>
+                    </m:sSub>
+                  </m:oMath>
+                </a14:m>
+                <a:r>
+                  <a:rPr lang="en-US" dirty="0" smtClean="0"/>
+                  <a:t>)* N(</a:t>
+                </a:r>
+                <a14:m>
+                  <m:oMath xmlns:m="http://schemas.openxmlformats.org/officeDocument/2006/math">
+                    <m:acc>
+                      <m:accPr>
+                        <m:chr m:val="̅"/>
+                        <m:ctrlPr>
+                          <a:rPr lang="en-US" b="0" i="1" smtClean="0">
+                            <a:latin typeface="Cambria Math" panose="02040503050406030204" pitchFamily="18" charset="0"/>
+                          </a:rPr>
+                        </m:ctrlPr>
+                      </m:accPr>
+                      <m:e>
+                        <m:r>
+                          <a:rPr lang="en-US" b="0" i="1" smtClean="0">
+                            <a:latin typeface="Cambria Math" panose="02040503050406030204" pitchFamily="18" charset="0"/>
+                          </a:rPr>
+                          <m:t>𝑥</m:t>
+                        </m:r>
+                      </m:e>
+                    </m:acc>
+                  </m:oMath>
+                </a14:m>
+                <a:r>
+                  <a:rPr lang="en-US" dirty="0" smtClean="0"/>
+                  <a:t>, </a:t>
+                </a:r>
+                <a14:m>
+                  <m:oMath xmlns:m="http://schemas.openxmlformats.org/officeDocument/2006/math">
+                    <m:sSub>
+                      <m:sSubPr>
+                        <m:ctrlPr>
+                          <a:rPr lang="en-US" i="1">
+                            <a:latin typeface="Cambria Math" panose="02040503050406030204" pitchFamily="18" charset="0"/>
+                          </a:rPr>
+                        </m:ctrlPr>
+                      </m:sSubPr>
+                      <m:e>
+                        <m:r>
+                          <m:rPr>
+                            <m:sty m:val="p"/>
+                          </m:rPr>
+                          <a:rPr lang="en-US">
+                            <a:latin typeface="Cambria Math" panose="02040503050406030204" pitchFamily="18" charset="0"/>
+                          </a:rPr>
+                          <m:t>Σ</m:t>
+                        </m:r>
+                      </m:e>
+                      <m:sub>
+                        <m:r>
+                          <a:rPr lang="en-US" i="1">
+                            <a:latin typeface="Cambria Math" panose="02040503050406030204" pitchFamily="18" charset="0"/>
+                          </a:rPr>
+                          <m:t>𝑖</m:t>
+                        </m:r>
+                      </m:sub>
+                    </m:sSub>
+                  </m:oMath>
+                </a14:m>
+                <a:r>
+                  <a:rPr lang="en-US" dirty="0"/>
+                  <a:t>/</a:t>
+                </a:r>
+                <a14:m>
+                  <m:oMath xmlns:m="http://schemas.openxmlformats.org/officeDocument/2006/math">
+                    <m:r>
+                      <a:rPr lang="en-US" b="0" i="1" smtClean="0">
+                        <a:latin typeface="Cambria Math" panose="02040503050406030204" pitchFamily="18" charset="0"/>
+                      </a:rPr>
+                      <m:t>𝑛</m:t>
+                    </m:r>
+                  </m:oMath>
+                </a14:m>
+                <a:r>
+                  <a:rPr lang="en-US" dirty="0" smtClean="0"/>
+                  <a:t>) </a:t>
+                </a:r>
+              </a:p>
+              <a:p>
+                <a:r>
+                  <a:rPr lang="en-US" dirty="0" err="1" smtClean="0"/>
+                  <a:t>cij</a:t>
+                </a:r>
+                <a:r>
+                  <a:rPr lang="en-US" smtClean="0"/>
+                  <a:t>=k ~ </a:t>
+                </a:r>
+                <a:endParaRPr lang="en-US" dirty="0"/>
+              </a:p>
+            </p:txBody>
+          </p:sp>
+        </mc:Choice>
+        <mc:Fallback>
+          <p:sp>
+            <p:nvSpPr>
+              <p:cNvPr id="3" name="Content Placeholder 2"/>
+              <p:cNvSpPr>
+                <a:spLocks noGrp="1" noRot="1" noChangeAspect="1" noMove="1" noResize="1" noEditPoints="1" noAdjustHandles="1" noChangeArrowheads="1" noChangeShapeType="1" noTextEdit="1"/>
+              </p:cNvSpPr>
+              <p:nvPr>
+                <p:ph idx="1"/>
+              </p:nvPr>
+            </p:nvSpPr>
+            <p:spPr>
+              <a:blipFill>
+                <a:blip r:embed="rId2"/>
+                <a:stretch>
+                  <a:fillRect l="-1704" t="-1617"/>
+                </a:stretch>
+              </a:blipFill>
+            </p:spPr>
+            <p:txBody>
+              <a:bodyPr/>
+              <a:lstStyle/>
+              <a:p>
+                <a:r>
+                  <a:rPr lang="en-US">
+                    <a:noFill/>
+                  </a:rPr>
+                  <a:t> </a:t>
+                </a:r>
+              </a:p>
+            </p:txBody>
+          </p:sp>
+        </mc:Fallback>
+      </mc:AlternateContent>
+    </p:spTree>
+    <p:extLst>
+      <p:ext uri="{BB962C8B-B14F-4D97-AF65-F5344CB8AC3E}">
+        <p14:creationId xmlns:p14="http://schemas.microsoft.com/office/powerpoint/2010/main" val="1683665337"/>
       </p:ext>
     </p:extLst>
   </p:cSld>

</xml_diff>